<commit_message>
Updating with names for assigned slides
</commit_message>
<xml_diff>
--- a/docs/OptimisticOptimizers_Final_Presentation.pptx
+++ b/docs/OptimisticOptimizers_Final_Presentation.pptx
@@ -17,8 +17,8 @@
     <p:sldId id="274" r:id="rId8"/>
     <p:sldId id="275" r:id="rId9"/>
     <p:sldId id="276" r:id="rId10"/>
-    <p:sldId id="277" r:id="rId11"/>
-    <p:sldId id="279" r:id="rId12"/>
+    <p:sldId id="279" r:id="rId11"/>
+    <p:sldId id="277" r:id="rId12"/>
     <p:sldId id="278" r:id="rId13"/>
     <p:sldId id="269" r:id="rId14"/>
     <p:sldId id="271" r:id="rId15"/>
@@ -298,7 +298,7 @@
       </p15:sldGuideLst>
     </p:ext>
     <p:ext uri="http://customooxmlschemas.google.com/">
-      <go:slidesCustomData xmlns:go="http://customooxmlschemas.google.com/" xmlns:p15="http://schemas.microsoft.com/office/powerpoint/2012/main" xmlns:p14="http://schemas.microsoft.com/office/powerpoint/2010/main" xmlns:com="http://schemas.openxmlformats.org/drawingml/2006/compatibility" xmlns:pvml="urn:schemas-microsoft-com:office:powerpoint" xmlns:v="urn:schemas-microsoft-com:vml" xmlns:o="urn:schemas-microsoft-com:office:office" xmlns:dgm="http://schemas.openxmlformats.org/drawingml/2006/diagram" xmlns:c="http://schemas.openxmlformats.org/drawingml/2006/chart" xmlns:mv="urn:schemas-microsoft-com:mac:vml" xmlns:mc="http://schemas.openxmlformats.org/markup-compatibility/2006" xmlns="" r:id="rId34" roundtripDataSignature="AMtx7mjojz0DoAyIQVA0HHsnLe8mRB05yQ=="/>
+      <go:slidesCustomData xmlns="" xmlns:mc="http://schemas.openxmlformats.org/markup-compatibility/2006" xmlns:mv="urn:schemas-microsoft-com:mac:vml" xmlns:c="http://schemas.openxmlformats.org/drawingml/2006/chart" xmlns:dgm="http://schemas.openxmlformats.org/drawingml/2006/diagram" xmlns:o="urn:schemas-microsoft-com:office:office" xmlns:v="urn:schemas-microsoft-com:vml" xmlns:pvml="urn:schemas-microsoft-com:office:powerpoint" xmlns:com="http://schemas.openxmlformats.org/drawingml/2006/compatibility" xmlns:p14="http://schemas.microsoft.com/office/powerpoint/2010/main" xmlns:p15="http://schemas.microsoft.com/office/powerpoint/2012/main" xmlns:go="http://customooxmlschemas.google.com/" r:id="rId34" roundtripDataSignature="AMtx7mjojz0DoAyIQVA0HHsnLe8mRB05yQ=="/>
     </p:ext>
   </p:extLst>
 </p:presentation>
@@ -1989,11 +1989,7 @@
               <a:buSzPts val="1400"/>
               <a:buNone/>
             </a:pPr>
-            <a:r>
-              <a:rPr lang="en-US"/>
-              <a:t>We also want to be able to make a batch process for multiple images, and for each frame of the insitu TEM videos.</a:t>
-            </a:r>
-            <a:endParaRPr/>
+            <a:endParaRPr dirty="0"/>
           </a:p>
         </p:txBody>
       </p:sp>
@@ -2054,7 +2050,7 @@
     </p:spTree>
     <p:extLst>
       <p:ext uri="{BB962C8B-B14F-4D97-AF65-F5344CB8AC3E}">
-        <p14:creationId xmlns:p14="http://schemas.microsoft.com/office/powerpoint/2010/main" val="3370480286"/>
+        <p14:creationId xmlns:p14="http://schemas.microsoft.com/office/powerpoint/2010/main" val="2470032589"/>
       </p:ext>
     </p:extLst>
   </p:cSld>
@@ -2174,11 +2170,7 @@
               <a:buSzPts val="1400"/>
               <a:buNone/>
             </a:pPr>
-            <a:r>
-              <a:rPr lang="en-US"/>
-              <a:t>We also want to be able to make a batch process for multiple images, and for each frame of the insitu TEM videos.</a:t>
-            </a:r>
-            <a:endParaRPr/>
+            <a:endParaRPr dirty="0"/>
           </a:p>
         </p:txBody>
       </p:sp>
@@ -2359,11 +2351,7 @@
               <a:buSzPts val="1400"/>
               <a:buNone/>
             </a:pPr>
-            <a:r>
-              <a:rPr lang="en-US"/>
-              <a:t>We also want to be able to make a batch process for multiple images, and for each frame of the insitu TEM videos.</a:t>
-            </a:r>
-            <a:endParaRPr/>
+            <a:endParaRPr dirty="0"/>
           </a:p>
         </p:txBody>
       </p:sp>
@@ -4146,11 +4134,7 @@
               <a:buSzPts val="1400"/>
               <a:buNone/>
             </a:pPr>
-            <a:r>
-              <a:rPr lang="en-US"/>
-              <a:t>We also want to be able to make a batch process for multiple images, and for each frame of the insitu TEM videos.</a:t>
-            </a:r>
-            <a:endParaRPr/>
+            <a:endParaRPr dirty="0"/>
           </a:p>
         </p:txBody>
       </p:sp>
@@ -4211,7 +4195,7 @@
     </p:spTree>
     <p:extLst>
       <p:ext uri="{BB962C8B-B14F-4D97-AF65-F5344CB8AC3E}">
-        <p14:creationId xmlns:p14="http://schemas.microsoft.com/office/powerpoint/2010/main" val="2470032589"/>
+        <p14:creationId xmlns:p14="http://schemas.microsoft.com/office/powerpoint/2010/main" val="3370480286"/>
       </p:ext>
     </p:extLst>
   </p:cSld>
@@ -11865,7 +11849,7 @@
             </a:pPr>
             <a:r>
               <a:rPr lang="en-US" dirty="0"/>
-              <a:t>Results</a:t>
+              <a:t>Data Collection - Ahmed</a:t>
             </a:r>
             <a:endParaRPr dirty="0"/>
           </a:p>
@@ -11874,7 +11858,7 @@
     </p:spTree>
     <p:extLst>
       <p:ext uri="{BB962C8B-B14F-4D97-AF65-F5344CB8AC3E}">
-        <p14:creationId xmlns:p14="http://schemas.microsoft.com/office/powerpoint/2010/main" val="3858969681"/>
+        <p14:creationId xmlns:p14="http://schemas.microsoft.com/office/powerpoint/2010/main" val="1548055522"/>
       </p:ext>
     </p:extLst>
   </p:cSld>
@@ -11991,7 +11975,7 @@
             </a:pPr>
             <a:r>
               <a:rPr lang="en-US" dirty="0"/>
-              <a:t>GitHub Organization</a:t>
+              <a:t>GitHub Organization - Sara</a:t>
             </a:r>
             <a:endParaRPr dirty="0"/>
           </a:p>
@@ -12117,7 +12101,7 @@
             </a:pPr>
             <a:r>
               <a:rPr lang="en-US" dirty="0"/>
-              <a:t>Future</a:t>
+              <a:t>Future - Huat </a:t>
             </a:r>
             <a:endParaRPr dirty="0"/>
           </a:p>
@@ -12546,7 +12530,7 @@
             </a:pPr>
             <a:r>
               <a:rPr lang="en-US" dirty="0"/>
-              <a:t>Project Description</a:t>
+              <a:t>Project Description - Beth</a:t>
             </a:r>
             <a:endParaRPr dirty="0"/>
           </a:p>
@@ -12732,10 +12716,10 @@
               <a:buNone/>
             </a:pPr>
             <a:r>
-              <a:rPr lang="en-US"/>
-              <a:t>Motivation</a:t>
+              <a:rPr lang="en-US" dirty="0"/>
+              <a:t>Motivation - Salek</a:t>
             </a:r>
-            <a:endParaRPr/>
+            <a:endParaRPr dirty="0"/>
           </a:p>
         </p:txBody>
       </p:sp>
@@ -13070,7 +13054,7 @@
             </a:pPr>
             <a:r>
               <a:rPr lang="en-US" dirty="0"/>
-              <a:t>Beth’s Optimizers</a:t>
+              <a:t>Bayes_Opt</a:t>
             </a:r>
             <a:endParaRPr dirty="0"/>
           </a:p>
@@ -13092,7 +13076,12 @@
             <p:ph type="body" idx="1"/>
           </p:nvPr>
         </p:nvSpPr>
-        <p:spPr/>
+        <p:spPr>
+          <a:xfrm>
+            <a:off x="408460" y="1836545"/>
+            <a:ext cx="4548551" cy="2365901"/>
+          </a:xfrm>
+        </p:spPr>
         <p:txBody>
           <a:bodyPr/>
           <a:lstStyle/>
@@ -13704,7 +13693,7 @@
             </a:pPr>
             <a:r>
               <a:rPr lang="en-US" dirty="0"/>
-              <a:t>Data Collection</a:t>
+              <a:t>Results - Huat</a:t>
             </a:r>
             <a:endParaRPr dirty="0"/>
           </a:p>
@@ -13713,7 +13702,7 @@
     </p:spTree>
     <p:extLst>
       <p:ext uri="{BB962C8B-B14F-4D97-AF65-F5344CB8AC3E}">
-        <p14:creationId xmlns:p14="http://schemas.microsoft.com/office/powerpoint/2010/main" val="1548055522"/>
+        <p14:creationId xmlns:p14="http://schemas.microsoft.com/office/powerpoint/2010/main" val="3858969681"/>
       </p:ext>
     </p:extLst>
   </p:cSld>

</xml_diff>